<commit_message>
win 10 may have built in, but ...
</commit_message>
<xml_diff>
--- a/4-4-4.scp+sftp.pptx
+++ b/4-4-4.scp+sftp.pptx
@@ -5,23 +5,24 @@
     <p:sldMasterId id="2147483660" r:id="rId1"/>
   </p:sldMasterIdLst>
   <p:notesMasterIdLst>
-    <p:notesMasterId r:id="rId13"/>
+    <p:notesMasterId r:id="rId14"/>
   </p:notesMasterIdLst>
   <p:handoutMasterIdLst>
-    <p:handoutMasterId r:id="rId14"/>
+    <p:handoutMasterId r:id="rId15"/>
   </p:handoutMasterIdLst>
   <p:sldIdLst>
     <p:sldId id="256" r:id="rId2"/>
     <p:sldId id="265" r:id="rId3"/>
     <p:sldId id="264" r:id="rId4"/>
-    <p:sldId id="257" r:id="rId5"/>
-    <p:sldId id="258" r:id="rId6"/>
-    <p:sldId id="259" r:id="rId7"/>
-    <p:sldId id="260" r:id="rId8"/>
-    <p:sldId id="261" r:id="rId9"/>
-    <p:sldId id="262" r:id="rId10"/>
-    <p:sldId id="263" r:id="rId11"/>
-    <p:sldId id="266" r:id="rId12"/>
+    <p:sldId id="267" r:id="rId5"/>
+    <p:sldId id="257" r:id="rId6"/>
+    <p:sldId id="258" r:id="rId7"/>
+    <p:sldId id="259" r:id="rId8"/>
+    <p:sldId id="260" r:id="rId9"/>
+    <p:sldId id="261" r:id="rId10"/>
+    <p:sldId id="262" r:id="rId11"/>
+    <p:sldId id="263" r:id="rId12"/>
+    <p:sldId id="266" r:id="rId13"/>
   </p:sldIdLst>
   <p:sldSz cx="9144000" cy="6858000" type="screen4x3"/>
   <p:notesSz cx="6858000" cy="9144000"/>
@@ -4181,6 +4182,225 @@
             <p:ph type="title"/>
           </p:nvPr>
         </p:nvSpPr>
+        <p:spPr/>
+        <p:txBody>
+          <a:bodyPr/>
+          <a:lstStyle/>
+          <a:p>
+            <a:r>
+              <a:rPr lang="en-US" sz="5400" dirty="0"/>
+              <a:t>Passphrase of Private Key</a:t>
+            </a:r>
+          </a:p>
+        </p:txBody>
+      </p:sp>
+      <p:sp>
+        <p:nvSpPr>
+          <p:cNvPr id="3" name="Date Placeholder 2"/>
+          <p:cNvSpPr>
+            <a:spLocks noGrp="1"/>
+          </p:cNvSpPr>
+          <p:nvPr>
+            <p:ph type="dt" idx="10"/>
+          </p:nvPr>
+        </p:nvSpPr>
+        <p:spPr/>
+        <p:txBody>
+          <a:bodyPr/>
+          <a:lstStyle/>
+          <a:p>
+            <a:r>
+              <a:rPr lang="en-US"/>
+              <a:t>4-4-4 scp &amp; sftp</a:t>
+            </a:r>
+          </a:p>
+        </p:txBody>
+      </p:sp>
+      <p:sp>
+        <p:nvSpPr>
+          <p:cNvPr id="4" name="Slide Number Placeholder 3"/>
+          <p:cNvSpPr>
+            <a:spLocks noGrp="1"/>
+          </p:cNvSpPr>
+          <p:nvPr>
+            <p:ph type="sldNum" idx="11"/>
+          </p:nvPr>
+        </p:nvSpPr>
+        <p:spPr/>
+        <p:txBody>
+          <a:bodyPr/>
+          <a:lstStyle/>
+          <a:p>
+            <a:fld id="{CB0F635E-DD49-6B4E-AF79-9562F4F8D9AC}" type="slidenum">
+              <a:rPr lang="en-US" smtClean="0"/>
+              <a:t>9</a:t>
+            </a:fld>
+            <a:endParaRPr lang="en-US"/>
+          </a:p>
+        </p:txBody>
+      </p:sp>
+      <p:sp>
+        <p:nvSpPr>
+          <p:cNvPr id="5" name="Footer Placeholder 4"/>
+          <p:cNvSpPr>
+            <a:spLocks noGrp="1"/>
+          </p:cNvSpPr>
+          <p:nvPr>
+            <p:ph type="ftr" sz="quarter" idx="12"/>
+          </p:nvPr>
+        </p:nvSpPr>
+        <p:spPr/>
+        <p:txBody>
+          <a:bodyPr/>
+          <a:lstStyle/>
+          <a:p>
+            <a:r>
+              <a:rPr lang="en-US"/>
+              <a:t>Creative Commons: Attribution-NonCommercial-ShareAlike</a:t>
+            </a:r>
+            <a:endParaRPr lang="en-US" dirty="0"/>
+          </a:p>
+        </p:txBody>
+      </p:sp>
+      <p:pic>
+        <p:nvPicPr>
+          <p:cNvPr id="6" name="Picture 5" descr="5.tiff"/>
+          <p:cNvPicPr>
+            <a:picLocks noChangeAspect="1"/>
+          </p:cNvPicPr>
+          <p:nvPr/>
+        </p:nvPicPr>
+        <p:blipFill>
+          <a:blip r:embed="rId2">
+            <a:extLst>
+              <a:ext uri="{28A0092B-C50C-407E-A947-70E740481C1C}">
+                <a14:useLocalDpi xmlns:a14="http://schemas.microsoft.com/office/drawing/2010/main" val="0"/>
+              </a:ext>
+            </a:extLst>
+          </a:blip>
+          <a:stretch>
+            <a:fillRect/>
+          </a:stretch>
+        </p:blipFill>
+        <p:spPr>
+          <a:xfrm>
+            <a:off x="2117137" y="2067278"/>
+            <a:ext cx="5003800" cy="3937000"/>
+          </a:xfrm>
+          <a:prstGeom prst="rect">
+            <a:avLst/>
+          </a:prstGeom>
+        </p:spPr>
+      </p:pic>
+      <p:sp>
+        <p:nvSpPr>
+          <p:cNvPr id="7" name="Oval 6"/>
+          <p:cNvSpPr/>
+          <p:nvPr/>
+        </p:nvSpPr>
+        <p:spPr bwMode="auto">
+          <a:xfrm>
+            <a:off x="2117137" y="5017247"/>
+            <a:ext cx="2812344" cy="445432"/>
+          </a:xfrm>
+          <a:prstGeom prst="ellipse">
+            <a:avLst/>
+          </a:prstGeom>
+          <a:solidFill>
+            <a:srgbClr val="F100F5">
+              <a:alpha val="37000"/>
+            </a:srgbClr>
+          </a:solidFill>
+          <a:ln w="9525" cap="flat" cmpd="sng" algn="ctr">
+            <a:solidFill>
+              <a:schemeClr val="tx1"/>
+            </a:solidFill>
+            <a:prstDash val="solid"/>
+            <a:round/>
+            <a:headEnd type="none" w="med" len="med"/>
+            <a:tailEnd type="none" w="med" len="med"/>
+          </a:ln>
+          <a:effectLst/>
+        </p:spPr>
+        <p:txBody>
+          <a:bodyPr vert="horz" wrap="square" lIns="91440" tIns="45720" rIns="91440" bIns="45720" numCol="1" rtlCol="0" anchor="t" anchorCtr="0" compatLnSpc="1">
+            <a:prstTxWarp prst="textNoShape">
+              <a:avLst/>
+            </a:prstTxWarp>
+          </a:bodyPr>
+          <a:lstStyle/>
+          <a:p>
+            <a:pPr marL="0" marR="0" indent="0" algn="l" defTabSz="457200" rtl="0" eaLnBrk="1" fontAlgn="base" latinLnBrk="0" hangingPunct="1">
+              <a:lnSpc>
+                <a:spcPct val="100000"/>
+              </a:lnSpc>
+              <a:spcBef>
+                <a:spcPct val="0"/>
+              </a:spcBef>
+              <a:spcAft>
+                <a:spcPct val="0"/>
+              </a:spcAft>
+              <a:buClr>
+                <a:srgbClr val="000000"/>
+              </a:buClr>
+              <a:buSzPct val="100000"/>
+              <a:buFont typeface="Times New Roman" charset="0"/>
+              <a:buNone/>
+              <a:tabLst/>
+            </a:pPr>
+            <a:endParaRPr kumimoji="0" lang="en-US" sz="2400" b="0" i="0" u="none" strike="noStrike" cap="none" normalizeH="0" baseline="0">
+              <a:ln>
+                <a:noFill/>
+              </a:ln>
+              <a:solidFill>
+                <a:schemeClr val="bg1"/>
+              </a:solidFill>
+              <a:effectLst/>
+              <a:latin typeface="Arial" charset="0"/>
+            </a:endParaRPr>
+          </a:p>
+        </p:txBody>
+      </p:sp>
+    </p:spTree>
+    <p:extLst>
+      <p:ext uri="{BB962C8B-B14F-4D97-AF65-F5344CB8AC3E}">
+        <p14:creationId xmlns:p14="http://schemas.microsoft.com/office/powerpoint/2010/main" val="3752108978"/>
+      </p:ext>
+    </p:extLst>
+  </p:cSld>
+  <p:clrMapOvr>
+    <a:masterClrMapping/>
+  </p:clrMapOvr>
+</p:sld>
+</file>
+
+<file path=ppt/slides/slide11.xml><?xml version="1.0" encoding="utf-8"?>
+<p:sld xmlns:a="http://schemas.openxmlformats.org/drawingml/2006/main" xmlns:r="http://schemas.openxmlformats.org/officeDocument/2006/relationships" xmlns:p="http://schemas.openxmlformats.org/presentationml/2006/main">
+  <p:cSld>
+    <p:spTree>
+      <p:nvGrpSpPr>
+        <p:cNvPr id="1" name=""/>
+        <p:cNvGrpSpPr/>
+        <p:nvPr/>
+      </p:nvGrpSpPr>
+      <p:grpSpPr>
+        <a:xfrm>
+          <a:off x="0" y="0"/>
+          <a:ext cx="0" cy="0"/>
+          <a:chOff x="0" y="0"/>
+          <a:chExt cx="0" cy="0"/>
+        </a:xfrm>
+      </p:grpSpPr>
+      <p:sp>
+        <p:nvSpPr>
+          <p:cNvPr id="2" name="Title 1"/>
+          <p:cNvSpPr>
+            <a:spLocks noGrp="1"/>
+          </p:cNvSpPr>
+          <p:nvPr>
+            <p:ph type="title"/>
+          </p:nvPr>
+        </p:nvSpPr>
         <p:spPr>
           <a:xfrm>
             <a:off x="0" y="-215899"/>
@@ -4237,7 +4457,7 @@
           <a:p>
             <a:fld id="{CB0F635E-DD49-6B4E-AF79-9562F4F8D9AC}" type="slidenum">
               <a:rPr lang="en-US" smtClean="0"/>
-              <a:t>9</a:t>
+              <a:t>10</a:t>
             </a:fld>
             <a:endParaRPr lang="en-US"/>
           </a:p>
@@ -4399,7 +4619,7 @@
 </p:sld>
 </file>
 
-<file path=ppt/slides/slide11.xml><?xml version="1.0" encoding="utf-8"?>
+<file path=ppt/slides/slide12.xml><?xml version="1.0" encoding="utf-8"?>
 <p:sld xmlns:a="http://schemas.openxmlformats.org/drawingml/2006/main" xmlns:r="http://schemas.openxmlformats.org/officeDocument/2006/relationships" xmlns:p="http://schemas.openxmlformats.org/presentationml/2006/main">
   <p:cSld>
     <p:spTree>
@@ -4461,15 +4681,11 @@
               <a:t>to see that all your</a:t>
             </a:r>
             <a:br>
-              <a:rPr lang="en-US"/>
+              <a:rPr lang="en-US" dirty="0"/>
             </a:br>
             <a:r>
-              <a:rPr lang="en-US"/>
-              <a:t>traffic </a:t>
-            </a:r>
-            <a:r>
               <a:rPr lang="en-US" dirty="0"/>
-              <a:t>is encrypted</a:t>
+              <a:t>traffic is encrypted</a:t>
             </a:r>
           </a:p>
         </p:txBody>
@@ -4525,7 +4741,7 @@
           <a:p>
             <a:fld id="{CB0F635E-DD49-6B4E-AF79-9562F4F8D9AC}" type="slidenum">
               <a:rPr lang="en-US" smtClean="0"/>
-              <a:t>10</a:t>
+              <a:t>11</a:t>
             </a:fld>
             <a:endParaRPr lang="en-US"/>
           </a:p>
@@ -4940,7 +5156,13 @@
       </p:grpSpPr>
       <p:sp>
         <p:nvSpPr>
-          <p:cNvPr id="2" name="Title 1"/>
+          <p:cNvPr id="2" name="Title 1">
+            <a:extLst>
+              <a:ext uri="{FF2B5EF4-FFF2-40B4-BE49-F238E27FC236}">
+                <a16:creationId xmlns:a16="http://schemas.microsoft.com/office/drawing/2014/main" id="{428E135C-DA95-DB4D-A317-608D249C11F1}"/>
+              </a:ext>
+            </a:extLst>
+          </p:cNvPr>
           <p:cNvSpPr>
             <a:spLocks noGrp="1"/>
           </p:cNvSpPr>
@@ -4950,8 +5172,8 @@
         </p:nvSpPr>
         <p:spPr>
           <a:xfrm>
-            <a:off x="0" y="1"/>
-            <a:ext cx="9204325" cy="1364074"/>
+            <a:off x="0" y="-4900"/>
+            <a:ext cx="9142413" cy="6485213"/>
           </a:xfrm>
         </p:spPr>
         <p:txBody>
@@ -4959,87 +5181,53 @@
           <a:lstStyle/>
           <a:p>
             <a:r>
+              <a:rPr lang="en-US" dirty="0" err="1"/>
+              <a:t>scp</a:t>
+            </a:r>
+            <a:r>
               <a:rPr lang="en-US" dirty="0"/>
-              <a:t>Windows Get Software</a:t>
-            </a:r>
-          </a:p>
-        </p:txBody>
-      </p:sp>
-      <p:sp>
-        <p:nvSpPr>
-          <p:cNvPr id="3" name="Content Placeholder 2"/>
-          <p:cNvSpPr>
-            <a:spLocks noGrp="1"/>
-          </p:cNvSpPr>
-          <p:nvPr>
-            <p:ph idx="1"/>
-          </p:nvPr>
-        </p:nvSpPr>
-        <p:spPr>
-          <a:xfrm>
-            <a:off x="920300" y="2107322"/>
-            <a:ext cx="7379170" cy="3758002"/>
-          </a:xfrm>
-        </p:spPr>
-        <p:txBody>
-          <a:bodyPr/>
-          <a:lstStyle/>
-          <a:p>
-            <a:r>
+              <a:t> and sftp are</a:t>
+            </a:r>
+            <a:br>
               <a:rPr lang="en-US" dirty="0"/>
-              <a:t>http://</a:t>
-            </a:r>
-            <a:r>
-              <a:rPr lang="en-US" dirty="0" err="1"/>
-              <a:t>winscp.net</a:t>
-            </a:r>
+            </a:br>
             <a:r>
               <a:rPr lang="en-US" dirty="0"/>
-              <a:t>/</a:t>
-            </a:r>
-            <a:r>
-              <a:rPr lang="en-US" dirty="0" err="1"/>
-              <a:t>eng</a:t>
-            </a:r>
-            <a:r>
+              <a:t>supposedly built in</a:t>
+            </a:r>
+            <a:br>
               <a:rPr lang="en-US" dirty="0"/>
-              <a:t>/</a:t>
-            </a:r>
-            <a:r>
-              <a:rPr lang="en-US" dirty="0" err="1"/>
-              <a:t>download.php</a:t>
-            </a:r>
-            <a:endParaRPr lang="en-US" dirty="0"/>
-          </a:p>
-          <a:p>
-            <a:endParaRPr lang="en-US" b="1" dirty="0"/>
-          </a:p>
-          <a:p>
-            <a:pPr algn="ctr"/>
-            <a:r>
-              <a:rPr lang="en-US" b="1" dirty="0"/>
-              <a:t>Get WinSCP 5.13</a:t>
-            </a:r>
-          </a:p>
-          <a:p>
-            <a:pPr algn="ctr"/>
-            <a:endParaRPr lang="en-US" b="1" dirty="0"/>
-          </a:p>
-          <a:p>
-            <a:pPr algn="ctr"/>
-            <a:r>
-              <a:rPr lang="en-US" b="1" dirty="0"/>
-              <a:t>Do Not install Google Chrome</a:t>
-            </a:r>
-          </a:p>
-          <a:p>
-            <a:endParaRPr lang="en-US" b="1" dirty="0"/>
-          </a:p>
-        </p:txBody>
-      </p:sp>
-      <p:sp>
-        <p:nvSpPr>
-          <p:cNvPr id="4" name="Date Placeholder 3"/>
+            </a:br>
+            <a:r>
+              <a:rPr lang="en-US" dirty="0"/>
+              <a:t>Windows 10</a:t>
+            </a:r>
+            <a:br>
+              <a:rPr lang="en-US" dirty="0"/>
+            </a:br>
+            <a:r>
+              <a:rPr lang="en-US" dirty="0"/>
+              <a:t>but results using them</a:t>
+            </a:r>
+            <a:br>
+              <a:rPr lang="en-US" dirty="0"/>
+            </a:br>
+            <a:r>
+              <a:rPr lang="en-US" dirty="0"/>
+              <a:t>have been varied</a:t>
+            </a:r>
+          </a:p>
+        </p:txBody>
+      </p:sp>
+      <p:sp>
+        <p:nvSpPr>
+          <p:cNvPr id="4" name="Date Placeholder 3">
+            <a:extLst>
+              <a:ext uri="{FF2B5EF4-FFF2-40B4-BE49-F238E27FC236}">
+                <a16:creationId xmlns:a16="http://schemas.microsoft.com/office/drawing/2014/main" id="{22880E37-D5F6-2949-9CA5-F43F5D3163F6}"/>
+              </a:ext>
+            </a:extLst>
+          </p:cNvPr>
           <p:cNvSpPr>
             <a:spLocks noGrp="1"/>
           </p:cNvSpPr>
@@ -5061,7 +5249,13 @@
       </p:sp>
       <p:sp>
         <p:nvSpPr>
-          <p:cNvPr id="5" name="Slide Number Placeholder 4"/>
+          <p:cNvPr id="5" name="Slide Number Placeholder 4">
+            <a:extLst>
+              <a:ext uri="{FF2B5EF4-FFF2-40B4-BE49-F238E27FC236}">
+                <a16:creationId xmlns:a16="http://schemas.microsoft.com/office/drawing/2014/main" id="{EB5AC5F7-AAD0-8748-AA59-7B0528A8CF20}"/>
+              </a:ext>
+            </a:extLst>
+          </p:cNvPr>
           <p:cNvSpPr>
             <a:spLocks noGrp="1"/>
           </p:cNvSpPr>
@@ -5084,7 +5278,13 @@
       </p:sp>
       <p:sp>
         <p:nvSpPr>
-          <p:cNvPr id="6" name="Footer Placeholder 5"/>
+          <p:cNvPr id="6" name="Footer Placeholder 5">
+            <a:extLst>
+              <a:ext uri="{FF2B5EF4-FFF2-40B4-BE49-F238E27FC236}">
+                <a16:creationId xmlns:a16="http://schemas.microsoft.com/office/drawing/2014/main" id="{62019F12-06CE-BE49-9F3F-A46FE88E09D1}"/>
+              </a:ext>
+            </a:extLst>
+          </p:cNvPr>
           <p:cNvSpPr>
             <a:spLocks noGrp="1"/>
           </p:cNvSpPr>
@@ -5108,7 +5308,7 @@
     </p:spTree>
     <p:extLst>
       <p:ext uri="{BB962C8B-B14F-4D97-AF65-F5344CB8AC3E}">
-        <p14:creationId xmlns:p14="http://schemas.microsoft.com/office/powerpoint/2010/main" val="780916473"/>
+        <p14:creationId xmlns:p14="http://schemas.microsoft.com/office/powerpoint/2010/main" val="4294167944"/>
       </p:ext>
     </p:extLst>
   </p:cSld>
@@ -5147,6 +5347,203 @@
         </p:nvSpPr>
         <p:spPr>
           <a:xfrm>
+            <a:off x="0" y="1"/>
+            <a:ext cx="9204325" cy="1364074"/>
+          </a:xfrm>
+        </p:spPr>
+        <p:txBody>
+          <a:bodyPr/>
+          <a:lstStyle/>
+          <a:p>
+            <a:r>
+              <a:rPr lang="en-US" dirty="0"/>
+              <a:t>Windows Get Software</a:t>
+            </a:r>
+          </a:p>
+        </p:txBody>
+      </p:sp>
+      <p:sp>
+        <p:nvSpPr>
+          <p:cNvPr id="3" name="Content Placeholder 2"/>
+          <p:cNvSpPr>
+            <a:spLocks noGrp="1"/>
+          </p:cNvSpPr>
+          <p:nvPr>
+            <p:ph idx="1"/>
+          </p:nvPr>
+        </p:nvSpPr>
+        <p:spPr>
+          <a:xfrm>
+            <a:off x="920300" y="2107322"/>
+            <a:ext cx="7379170" cy="3758002"/>
+          </a:xfrm>
+        </p:spPr>
+        <p:txBody>
+          <a:bodyPr/>
+          <a:lstStyle/>
+          <a:p>
+            <a:r>
+              <a:rPr lang="en-US" dirty="0"/>
+              <a:t>http://</a:t>
+            </a:r>
+            <a:r>
+              <a:rPr lang="en-US" dirty="0" err="1"/>
+              <a:t>winscp.net</a:t>
+            </a:r>
+            <a:r>
+              <a:rPr lang="en-US" dirty="0"/>
+              <a:t>/</a:t>
+            </a:r>
+            <a:r>
+              <a:rPr lang="en-US" dirty="0" err="1"/>
+              <a:t>eng</a:t>
+            </a:r>
+            <a:r>
+              <a:rPr lang="en-US" dirty="0"/>
+              <a:t>/</a:t>
+            </a:r>
+            <a:r>
+              <a:rPr lang="en-US" dirty="0" err="1"/>
+              <a:t>download.php</a:t>
+            </a:r>
+            <a:endParaRPr lang="en-US" dirty="0"/>
+          </a:p>
+          <a:p>
+            <a:endParaRPr lang="en-US" b="1" dirty="0"/>
+          </a:p>
+          <a:p>
+            <a:pPr algn="ctr"/>
+            <a:r>
+              <a:rPr lang="en-US" b="1" dirty="0"/>
+              <a:t>Get WinSCP 5.13</a:t>
+            </a:r>
+          </a:p>
+          <a:p>
+            <a:pPr algn="ctr"/>
+            <a:endParaRPr lang="en-US" b="1" dirty="0"/>
+          </a:p>
+          <a:p>
+            <a:pPr algn="ctr"/>
+            <a:r>
+              <a:rPr lang="en-US" b="1" dirty="0"/>
+              <a:t>Do Not install Google Chrome</a:t>
+            </a:r>
+          </a:p>
+          <a:p>
+            <a:endParaRPr lang="en-US" b="1" dirty="0"/>
+          </a:p>
+        </p:txBody>
+      </p:sp>
+      <p:sp>
+        <p:nvSpPr>
+          <p:cNvPr id="4" name="Date Placeholder 3"/>
+          <p:cNvSpPr>
+            <a:spLocks noGrp="1"/>
+          </p:cNvSpPr>
+          <p:nvPr>
+            <p:ph type="dt" idx="10"/>
+          </p:nvPr>
+        </p:nvSpPr>
+        <p:spPr/>
+        <p:txBody>
+          <a:bodyPr/>
+          <a:lstStyle/>
+          <a:p>
+            <a:r>
+              <a:rPr lang="en-US"/>
+              <a:t>4-4-4 scp &amp; sftp</a:t>
+            </a:r>
+          </a:p>
+        </p:txBody>
+      </p:sp>
+      <p:sp>
+        <p:nvSpPr>
+          <p:cNvPr id="5" name="Slide Number Placeholder 4"/>
+          <p:cNvSpPr>
+            <a:spLocks noGrp="1"/>
+          </p:cNvSpPr>
+          <p:nvPr>
+            <p:ph type="sldNum" idx="11"/>
+          </p:nvPr>
+        </p:nvSpPr>
+        <p:spPr/>
+        <p:txBody>
+          <a:bodyPr/>
+          <a:lstStyle/>
+          <a:p>
+            <a:fld id="{CB0F635E-DD49-6B4E-AF79-9562F4F8D9AC}" type="slidenum">
+              <a:rPr lang="en-US" smtClean="0"/>
+              <a:t>4</a:t>
+            </a:fld>
+            <a:endParaRPr lang="en-US"/>
+          </a:p>
+        </p:txBody>
+      </p:sp>
+      <p:sp>
+        <p:nvSpPr>
+          <p:cNvPr id="6" name="Footer Placeholder 5"/>
+          <p:cNvSpPr>
+            <a:spLocks noGrp="1"/>
+          </p:cNvSpPr>
+          <p:nvPr>
+            <p:ph type="ftr" sz="quarter" idx="12"/>
+          </p:nvPr>
+        </p:nvSpPr>
+        <p:spPr/>
+        <p:txBody>
+          <a:bodyPr/>
+          <a:lstStyle/>
+          <a:p>
+            <a:r>
+              <a:rPr lang="en-US"/>
+              <a:t>Creative Commons: Attribution-NonCommercial-ShareAlike</a:t>
+            </a:r>
+            <a:endParaRPr lang="en-US" dirty="0"/>
+          </a:p>
+        </p:txBody>
+      </p:sp>
+    </p:spTree>
+    <p:extLst>
+      <p:ext uri="{BB962C8B-B14F-4D97-AF65-F5344CB8AC3E}">
+        <p14:creationId xmlns:p14="http://schemas.microsoft.com/office/powerpoint/2010/main" val="780916473"/>
+      </p:ext>
+    </p:extLst>
+  </p:cSld>
+  <p:clrMapOvr>
+    <a:masterClrMapping/>
+  </p:clrMapOvr>
+</p:sld>
+</file>
+
+<file path=ppt/slides/slide6.xml><?xml version="1.0" encoding="utf-8"?>
+<p:sld xmlns:a="http://schemas.openxmlformats.org/drawingml/2006/main" xmlns:r="http://schemas.openxmlformats.org/officeDocument/2006/relationships" xmlns:p="http://schemas.openxmlformats.org/presentationml/2006/main">
+  <p:cSld>
+    <p:spTree>
+      <p:nvGrpSpPr>
+        <p:cNvPr id="1" name=""/>
+        <p:cNvGrpSpPr/>
+        <p:nvPr/>
+      </p:nvGrpSpPr>
+      <p:grpSpPr>
+        <a:xfrm>
+          <a:off x="0" y="0"/>
+          <a:ext cx="0" cy="0"/>
+          <a:chOff x="0" y="0"/>
+          <a:chExt cx="0" cy="0"/>
+        </a:xfrm>
+      </p:grpSpPr>
+      <p:sp>
+        <p:nvSpPr>
+          <p:cNvPr id="2" name="Title 1"/>
+          <p:cNvSpPr>
+            <a:spLocks noGrp="1"/>
+          </p:cNvSpPr>
+          <p:nvPr>
+            <p:ph type="title"/>
+          </p:nvPr>
+        </p:nvSpPr>
+        <p:spPr>
+          <a:xfrm>
             <a:off x="0" y="0"/>
             <a:ext cx="9204325" cy="1223903"/>
           </a:xfrm>
@@ -5206,7 +5603,7 @@
           <a:p>
             <a:fld id="{CB0F635E-DD49-6B4E-AF79-9562F4F8D9AC}" type="slidenum">
               <a:rPr lang="en-US" smtClean="0"/>
-              <a:t>4</a:t>
+              <a:t>5</a:t>
             </a:fld>
             <a:endParaRPr lang="en-US"/>
           </a:p>
@@ -5347,7 +5744,7 @@
 </p:sld>
 </file>
 
-<file path=ppt/slides/slide6.xml><?xml version="1.0" encoding="utf-8"?>
+<file path=ppt/slides/slide7.xml><?xml version="1.0" encoding="utf-8"?>
 <p:sld xmlns:a="http://schemas.openxmlformats.org/drawingml/2006/main" xmlns:r="http://schemas.openxmlformats.org/officeDocument/2006/relationships" xmlns:p="http://schemas.openxmlformats.org/presentationml/2006/main">
   <p:cSld>
     <p:spTree>
@@ -5430,7 +5827,7 @@
           <a:p>
             <a:fld id="{CB0F635E-DD49-6B4E-AF79-9562F4F8D9AC}" type="slidenum">
               <a:rPr lang="en-US" smtClean="0"/>
-              <a:t>5</a:t>
+              <a:t>6</a:t>
             </a:fld>
             <a:endParaRPr lang="en-US"/>
           </a:p>
@@ -5640,7 +6037,7 @@
 </p:sld>
 </file>
 
-<file path=ppt/slides/slide7.xml><?xml version="1.0" encoding="utf-8"?>
+<file path=ppt/slides/slide8.xml><?xml version="1.0" encoding="utf-8"?>
 <p:sld xmlns:a="http://schemas.openxmlformats.org/drawingml/2006/main" xmlns:r="http://schemas.openxmlformats.org/officeDocument/2006/relationships" xmlns:p="http://schemas.openxmlformats.org/presentationml/2006/main">
   <p:cSld>
     <p:spTree>
@@ -5723,7 +6120,7 @@
           <a:p>
             <a:fld id="{CB0F635E-DD49-6B4E-AF79-9562F4F8D9AC}" type="slidenum">
               <a:rPr lang="en-US" smtClean="0"/>
-              <a:t>6</a:t>
+              <a:t>7</a:t>
             </a:fld>
             <a:endParaRPr lang="en-US"/>
           </a:p>
@@ -5902,7 +6299,7 @@
 </p:sld>
 </file>
 
-<file path=ppt/slides/slide8.xml><?xml version="1.0" encoding="utf-8"?>
+<file path=ppt/slides/slide9.xml><?xml version="1.0" encoding="utf-8"?>
 <p:sld xmlns:a="http://schemas.openxmlformats.org/drawingml/2006/main" xmlns:r="http://schemas.openxmlformats.org/officeDocument/2006/relationships" xmlns:p="http://schemas.openxmlformats.org/presentationml/2006/main">
   <p:cSld>
     <p:spTree>
@@ -5985,7 +6382,7 @@
           <a:p>
             <a:fld id="{CB0F635E-DD49-6B4E-AF79-9562F4F8D9AC}" type="slidenum">
               <a:rPr lang="en-US" smtClean="0"/>
-              <a:t>7</a:t>
+              <a:t>8</a:t>
             </a:fld>
             <a:endParaRPr lang="en-US"/>
           </a:p>
@@ -6048,225 +6445,6 @@
     <p:extLst>
       <p:ext uri="{BB962C8B-B14F-4D97-AF65-F5344CB8AC3E}">
         <p14:creationId xmlns:p14="http://schemas.microsoft.com/office/powerpoint/2010/main" val="2335798866"/>
-      </p:ext>
-    </p:extLst>
-  </p:cSld>
-  <p:clrMapOvr>
-    <a:masterClrMapping/>
-  </p:clrMapOvr>
-</p:sld>
-</file>
-
-<file path=ppt/slides/slide9.xml><?xml version="1.0" encoding="utf-8"?>
-<p:sld xmlns:a="http://schemas.openxmlformats.org/drawingml/2006/main" xmlns:r="http://schemas.openxmlformats.org/officeDocument/2006/relationships" xmlns:p="http://schemas.openxmlformats.org/presentationml/2006/main">
-  <p:cSld>
-    <p:spTree>
-      <p:nvGrpSpPr>
-        <p:cNvPr id="1" name=""/>
-        <p:cNvGrpSpPr/>
-        <p:nvPr/>
-      </p:nvGrpSpPr>
-      <p:grpSpPr>
-        <a:xfrm>
-          <a:off x="0" y="0"/>
-          <a:ext cx="0" cy="0"/>
-          <a:chOff x="0" y="0"/>
-          <a:chExt cx="0" cy="0"/>
-        </a:xfrm>
-      </p:grpSpPr>
-      <p:sp>
-        <p:nvSpPr>
-          <p:cNvPr id="2" name="Title 1"/>
-          <p:cNvSpPr>
-            <a:spLocks noGrp="1"/>
-          </p:cNvSpPr>
-          <p:nvPr>
-            <p:ph type="title"/>
-          </p:nvPr>
-        </p:nvSpPr>
-        <p:spPr/>
-        <p:txBody>
-          <a:bodyPr/>
-          <a:lstStyle/>
-          <a:p>
-            <a:r>
-              <a:rPr lang="en-US" sz="5400" dirty="0"/>
-              <a:t>Passphrase of Private Key</a:t>
-            </a:r>
-          </a:p>
-        </p:txBody>
-      </p:sp>
-      <p:sp>
-        <p:nvSpPr>
-          <p:cNvPr id="3" name="Date Placeholder 2"/>
-          <p:cNvSpPr>
-            <a:spLocks noGrp="1"/>
-          </p:cNvSpPr>
-          <p:nvPr>
-            <p:ph type="dt" idx="10"/>
-          </p:nvPr>
-        </p:nvSpPr>
-        <p:spPr/>
-        <p:txBody>
-          <a:bodyPr/>
-          <a:lstStyle/>
-          <a:p>
-            <a:r>
-              <a:rPr lang="en-US"/>
-              <a:t>4-4-4 scp &amp; sftp</a:t>
-            </a:r>
-          </a:p>
-        </p:txBody>
-      </p:sp>
-      <p:sp>
-        <p:nvSpPr>
-          <p:cNvPr id="4" name="Slide Number Placeholder 3"/>
-          <p:cNvSpPr>
-            <a:spLocks noGrp="1"/>
-          </p:cNvSpPr>
-          <p:nvPr>
-            <p:ph type="sldNum" idx="11"/>
-          </p:nvPr>
-        </p:nvSpPr>
-        <p:spPr/>
-        <p:txBody>
-          <a:bodyPr/>
-          <a:lstStyle/>
-          <a:p>
-            <a:fld id="{CB0F635E-DD49-6B4E-AF79-9562F4F8D9AC}" type="slidenum">
-              <a:rPr lang="en-US" smtClean="0"/>
-              <a:t>8</a:t>
-            </a:fld>
-            <a:endParaRPr lang="en-US"/>
-          </a:p>
-        </p:txBody>
-      </p:sp>
-      <p:sp>
-        <p:nvSpPr>
-          <p:cNvPr id="5" name="Footer Placeholder 4"/>
-          <p:cNvSpPr>
-            <a:spLocks noGrp="1"/>
-          </p:cNvSpPr>
-          <p:nvPr>
-            <p:ph type="ftr" sz="quarter" idx="12"/>
-          </p:nvPr>
-        </p:nvSpPr>
-        <p:spPr/>
-        <p:txBody>
-          <a:bodyPr/>
-          <a:lstStyle/>
-          <a:p>
-            <a:r>
-              <a:rPr lang="en-US"/>
-              <a:t>Creative Commons: Attribution-NonCommercial-ShareAlike</a:t>
-            </a:r>
-            <a:endParaRPr lang="en-US" dirty="0"/>
-          </a:p>
-        </p:txBody>
-      </p:sp>
-      <p:pic>
-        <p:nvPicPr>
-          <p:cNvPr id="6" name="Picture 5" descr="5.tiff"/>
-          <p:cNvPicPr>
-            <a:picLocks noChangeAspect="1"/>
-          </p:cNvPicPr>
-          <p:nvPr/>
-        </p:nvPicPr>
-        <p:blipFill>
-          <a:blip r:embed="rId2">
-            <a:extLst>
-              <a:ext uri="{28A0092B-C50C-407E-A947-70E740481C1C}">
-                <a14:useLocalDpi xmlns:a14="http://schemas.microsoft.com/office/drawing/2010/main" val="0"/>
-              </a:ext>
-            </a:extLst>
-          </a:blip>
-          <a:stretch>
-            <a:fillRect/>
-          </a:stretch>
-        </p:blipFill>
-        <p:spPr>
-          <a:xfrm>
-            <a:off x="2117137" y="2067278"/>
-            <a:ext cx="5003800" cy="3937000"/>
-          </a:xfrm>
-          <a:prstGeom prst="rect">
-            <a:avLst/>
-          </a:prstGeom>
-        </p:spPr>
-      </p:pic>
-      <p:sp>
-        <p:nvSpPr>
-          <p:cNvPr id="7" name="Oval 6"/>
-          <p:cNvSpPr/>
-          <p:nvPr/>
-        </p:nvSpPr>
-        <p:spPr bwMode="auto">
-          <a:xfrm>
-            <a:off x="2117137" y="5017247"/>
-            <a:ext cx="2812344" cy="445432"/>
-          </a:xfrm>
-          <a:prstGeom prst="ellipse">
-            <a:avLst/>
-          </a:prstGeom>
-          <a:solidFill>
-            <a:srgbClr val="F100F5">
-              <a:alpha val="37000"/>
-            </a:srgbClr>
-          </a:solidFill>
-          <a:ln w="9525" cap="flat" cmpd="sng" algn="ctr">
-            <a:solidFill>
-              <a:schemeClr val="tx1"/>
-            </a:solidFill>
-            <a:prstDash val="solid"/>
-            <a:round/>
-            <a:headEnd type="none" w="med" len="med"/>
-            <a:tailEnd type="none" w="med" len="med"/>
-          </a:ln>
-          <a:effectLst/>
-        </p:spPr>
-        <p:txBody>
-          <a:bodyPr vert="horz" wrap="square" lIns="91440" tIns="45720" rIns="91440" bIns="45720" numCol="1" rtlCol="0" anchor="t" anchorCtr="0" compatLnSpc="1">
-            <a:prstTxWarp prst="textNoShape">
-              <a:avLst/>
-            </a:prstTxWarp>
-          </a:bodyPr>
-          <a:lstStyle/>
-          <a:p>
-            <a:pPr marL="0" marR="0" indent="0" algn="l" defTabSz="457200" rtl="0" eaLnBrk="1" fontAlgn="base" latinLnBrk="0" hangingPunct="1">
-              <a:lnSpc>
-                <a:spcPct val="100000"/>
-              </a:lnSpc>
-              <a:spcBef>
-                <a:spcPct val="0"/>
-              </a:spcBef>
-              <a:spcAft>
-                <a:spcPct val="0"/>
-              </a:spcAft>
-              <a:buClr>
-                <a:srgbClr val="000000"/>
-              </a:buClr>
-              <a:buSzPct val="100000"/>
-              <a:buFont typeface="Times New Roman" charset="0"/>
-              <a:buNone/>
-              <a:tabLst/>
-            </a:pPr>
-            <a:endParaRPr kumimoji="0" lang="en-US" sz="2400" b="0" i="0" u="none" strike="noStrike" cap="none" normalizeH="0" baseline="0">
-              <a:ln>
-                <a:noFill/>
-              </a:ln>
-              <a:solidFill>
-                <a:schemeClr val="bg1"/>
-              </a:solidFill>
-              <a:effectLst/>
-              <a:latin typeface="Arial" charset="0"/>
-            </a:endParaRPr>
-          </a:p>
-        </p:txBody>
-      </p:sp>
-    </p:spTree>
-    <p:extLst>
-      <p:ext uri="{BB962C8B-B14F-4D97-AF65-F5344CB8AC3E}">
-        <p14:creationId xmlns:p14="http://schemas.microsoft.com/office/powerpoint/2010/main" val="3752108978"/>
       </p:ext>
     </p:extLst>
   </p:cSld>

</xml_diff>